<commit_message>
feat: latest and open
</commit_message>
<xml_diff>
--- a/test.pptx
+++ b/test.pptx
@@ -6,7 +6,7 @@
   </p:sldMasterIdLst>
   <p:sldIdLst>
     <p:sldId id="1120" r:id="rId2"/>
-    <p:sldId id="1121" r:id="rId7"/>
+    <p:sldId id="1121" r:id="rId3"/>
   </p:sldIdLst>
   <p:sldSz cx="9144000" cy="6858000" type="screen4x3"/>
   <p:notesSz cx="6858000" cy="9144000"/>
@@ -304,7 +304,7 @@
                 <a:tabLst/>
                 <a:defRPr/>
               </a:pPr>
-              <a:t>05/11/2023</a:t>
+              <a:t>12/11/2023</a:t>
             </a:fld>
             <a:endParaRPr kumimoji="0" lang="fr-FR" sz="1200" b="0" i="0" u="none" strike="noStrike" kern="1200" cap="none" spc="0" normalizeH="0" baseline="0" noProof="0">
               <a:ln>
@@ -634,7 +634,7 @@
                 <a:tabLst/>
                 <a:defRPr/>
               </a:pPr>
-              <a:t>05/11/2023</a:t>
+              <a:t>12/11/2023</a:t>
             </a:fld>
             <a:endParaRPr kumimoji="0" lang="fr-FR" sz="1200" b="0" i="0" u="none" strike="noStrike" kern="1200" cap="none" spc="0" normalizeH="0" baseline="0" noProof="0">
               <a:ln>
@@ -974,7 +974,7 @@
                 <a:tabLst/>
                 <a:defRPr/>
               </a:pPr>
-              <a:t>05/11/2023</a:t>
+              <a:t>12/11/2023</a:t>
             </a:fld>
             <a:endParaRPr kumimoji="0" lang="fr-FR" sz="1200" b="0" i="0" u="none" strike="noStrike" kern="1200" cap="none" spc="0" normalizeH="0" baseline="0" noProof="0">
               <a:ln>
@@ -1304,7 +1304,7 @@
                 <a:tabLst/>
                 <a:defRPr/>
               </a:pPr>
-              <a:t>05/11/2023</a:t>
+              <a:t>12/11/2023</a:t>
             </a:fld>
             <a:endParaRPr kumimoji="0" lang="fr-FR" sz="1200" b="0" i="0" u="none" strike="noStrike" kern="1200" cap="none" spc="0" normalizeH="0" baseline="0" noProof="0">
               <a:ln>
@@ -1708,7 +1708,7 @@
                 <a:tabLst/>
                 <a:defRPr/>
               </a:pPr>
-              <a:t>05/11/2023</a:t>
+              <a:t>12/11/2023</a:t>
             </a:fld>
             <a:endParaRPr kumimoji="0" lang="fr-FR" sz="1200" b="0" i="0" u="none" strike="noStrike" kern="1200" cap="none" spc="0" normalizeH="0" baseline="0" noProof="0">
               <a:ln>
@@ -2100,7 +2100,7 @@
                 <a:tabLst/>
                 <a:defRPr/>
               </a:pPr>
-              <a:t>05/11/2023</a:t>
+              <a:t>12/11/2023</a:t>
             </a:fld>
             <a:endParaRPr kumimoji="0" lang="fr-FR" sz="1200" b="0" i="0" u="none" strike="noStrike" kern="1200" cap="none" spc="0" normalizeH="0" baseline="0" noProof="0">
               <a:ln>
@@ -2627,7 +2627,7 @@
                 <a:tabLst/>
                 <a:defRPr/>
               </a:pPr>
-              <a:t>05/11/2023</a:t>
+              <a:t>12/11/2023</a:t>
             </a:fld>
             <a:endParaRPr kumimoji="0" lang="fr-FR" sz="1200" b="0" i="0" u="none" strike="noStrike" kern="1200" cap="none" spc="0" normalizeH="0" baseline="0" noProof="0">
               <a:ln>
@@ -2905,7 +2905,7 @@
                 <a:tabLst/>
                 <a:defRPr/>
               </a:pPr>
-              <a:t>05/11/2023</a:t>
+              <a:t>12/11/2023</a:t>
             </a:fld>
             <a:endParaRPr kumimoji="0" lang="fr-FR" sz="1200" b="0" i="0" u="none" strike="noStrike" kern="1200" cap="none" spc="0" normalizeH="0" baseline="0" noProof="0">
               <a:ln>
@@ -3160,7 +3160,7 @@
                 <a:tabLst/>
                 <a:defRPr/>
               </a:pPr>
-              <a:t>05/11/2023</a:t>
+              <a:t>12/11/2023</a:t>
             </a:fld>
             <a:endParaRPr kumimoji="0" lang="fr-FR" sz="1200" b="0" i="0" u="none" strike="noStrike" kern="1200" cap="none" spc="0" normalizeH="0" baseline="0" noProof="0">
               <a:ln>
@@ -3597,7 +3597,7 @@
                 <a:tabLst/>
                 <a:defRPr/>
               </a:pPr>
-              <a:t>05/11/2023</a:t>
+              <a:t>12/11/2023</a:t>
             </a:fld>
             <a:endParaRPr kumimoji="0" lang="fr-FR" sz="1200" b="0" i="0" u="none" strike="noStrike" kern="1200" cap="none" spc="0" normalizeH="0" baseline="0" noProof="0">
               <a:ln>
@@ -4014,7 +4014,7 @@
                 <a:tabLst/>
                 <a:defRPr/>
               </a:pPr>
-              <a:t>05/11/2023</a:t>
+              <a:t>12/11/2023</a:t>
             </a:fld>
             <a:endParaRPr kumimoji="0" lang="fr-FR" sz="1200" b="0" i="0" u="none" strike="noStrike" kern="1200" cap="none" spc="0" normalizeH="0" baseline="0" noProof="0">
               <a:ln>
@@ -4397,7 +4397,7 @@
                 <a:tabLst/>
                 <a:defRPr/>
               </a:pPr>
-              <a:t>05/11/2023</a:t>
+              <a:t>12/11/2023</a:t>
             </a:fld>
             <a:endParaRPr kumimoji="0" lang="fr-FR" sz="1200" b="0" i="0" u="none" strike="noStrike" kern="1200" cap="none" spc="0" normalizeH="0" baseline="0" noProof="0">
               <a:ln>
@@ -4961,7 +4961,12 @@
               </a:defRPr>
             </a:pPr>
             <a:r>
-              <a:t>Salamo </a:t>
+              <a:rPr dirty="0" err="1"/>
+              <a:t>Nomery</a:t>
+            </a:r>
+            <a:r>
+              <a:rPr dirty="0"/>
+              <a:t> </a:t>
             </a:r>
           </a:p>
           <a:p>
@@ -4974,7 +4979,8 @@
               </a:defRPr>
             </a:pPr>
             <a:r>
-              <a:t>150 : 1</a:t>
+              <a:rPr dirty="0"/>
+              <a:t>1 : 5</a:t>
             </a:r>
           </a:p>
         </p:txBody>
@@ -4993,7 +4999,7 @@
 </file>
 
 <file path=ppt/slides/slide2.xml><?xml version="1.0" encoding="utf-8"?>
-<p:sld xmlns:a="http://schemas.openxmlformats.org/drawingml/2006/main" xmlns:p="http://schemas.openxmlformats.org/presentationml/2006/main" xmlns:r="http://schemas.openxmlformats.org/officeDocument/2006/relationships">
+<p:sld xmlns:a="http://schemas.openxmlformats.org/drawingml/2006/main" xmlns:r="http://schemas.openxmlformats.org/officeDocument/2006/relationships" xmlns:p="http://schemas.openxmlformats.org/presentationml/2006/main">
   <p:cSld>
     <p:spTree>
       <p:nvGrpSpPr>
@@ -5001,7 +5007,14 @@
         <p:cNvGrpSpPr/>
         <p:nvPr/>
       </p:nvGrpSpPr>
-      <p:grpSpPr/>
+      <p:grpSpPr>
+        <a:xfrm>
+          <a:off x="0" y="0"/>
+          <a:ext cx="0" cy="0"/>
+          <a:chOff x="0" y="0"/>
+          <a:chExt cx="0" cy="0"/>
+        </a:xfrm>
+      </p:grpSpPr>
       <p:sp>
         <p:nvSpPr>
           <p:cNvPr id="2" name="Title 1"/>
@@ -5014,6 +5027,7 @@
         </p:nvSpPr>
         <p:spPr>
           <a:xfrm>
+            <a:off x="0" y="0"/>
             <a:ext cx="9144000" cy="6858000"/>
           </a:xfrm>
         </p:spPr>
@@ -5027,8 +5041,126 @@
               </a:defRPr>
             </a:pPr>
             <a:r>
-              <a:t>1 Haleloia. Miderà an'Andriamanitra eo amin'ny fitoerany masina. Miderà Azy eo amin'ny habakabaky ny heriny.</a:t>
-            </a:r>
+              <a:rPr dirty="0"/>
+              <a:t>5 </a:t>
+            </a:r>
+            <a:r>
+              <a:rPr dirty="0" err="1"/>
+              <a:t>Ary</a:t>
+            </a:r>
+            <a:r>
+              <a:rPr dirty="0"/>
+              <a:t> </a:t>
+            </a:r>
+            <a:r>
+              <a:rPr dirty="0" err="1"/>
+              <a:t>izao</a:t>
+            </a:r>
+            <a:r>
+              <a:rPr dirty="0"/>
+              <a:t> no </a:t>
+            </a:r>
+            <a:r>
+              <a:rPr dirty="0" err="1"/>
+              <a:t>anaran'ireo</a:t>
+            </a:r>
+            <a:r>
+              <a:rPr dirty="0"/>
+              <a:t> </a:t>
+            </a:r>
+            <a:r>
+              <a:rPr dirty="0" err="1"/>
+              <a:t>lehilahy</a:t>
+            </a:r>
+            <a:r>
+              <a:rPr dirty="0"/>
+              <a:t> ho </a:t>
+            </a:r>
+            <a:r>
+              <a:rPr dirty="0" err="1"/>
+              <a:t>namanareo</a:t>
+            </a:r>
+            <a:r>
+              <a:rPr dirty="0"/>
+              <a:t> </a:t>
+            </a:r>
+            <a:r>
+              <a:rPr dirty="0" err="1"/>
+              <a:t>ireo</a:t>
+            </a:r>
+            <a:r>
+              <a:rPr dirty="0"/>
+              <a:t>: </a:t>
+            </a:r>
+            <a:r>
+              <a:rPr dirty="0" err="1"/>
+              <a:t>Ny</a:t>
+            </a:r>
+            <a:r>
+              <a:rPr dirty="0"/>
+              <a:t> </a:t>
+            </a:r>
+            <a:r>
+              <a:rPr dirty="0" err="1"/>
+              <a:t>avy</a:t>
+            </a:r>
+            <a:r>
+              <a:rPr dirty="0"/>
+              <a:t> </a:t>
+            </a:r>
+            <a:r>
+              <a:rPr dirty="0" err="1"/>
+              <a:t>amin'i</a:t>
+            </a:r>
+            <a:r>
+              <a:rPr dirty="0"/>
+              <a:t> </a:t>
+            </a:r>
+            <a:r>
+              <a:rPr dirty="0" err="1"/>
+              <a:t>Robena</a:t>
+            </a:r>
+            <a:r>
+              <a:rPr dirty="0"/>
+              <a:t> </a:t>
+            </a:r>
+            <a:r>
+              <a:rPr dirty="0" err="1"/>
+              <a:t>dia</a:t>
+            </a:r>
+            <a:r>
+              <a:rPr dirty="0"/>
+              <a:t> </a:t>
+            </a:r>
+            <a:r>
+              <a:rPr dirty="0" err="1"/>
+              <a:t>Elizora</a:t>
+            </a:r>
+            <a:r>
+              <a:rPr dirty="0" smtClean="0"/>
+              <a:t>,</a:t>
+            </a:r>
+            <a:r>
+              <a:rPr lang="fr-FR" dirty="0" smtClean="0"/>
+              <a:t> </a:t>
+            </a:r>
+            <a:r>
+              <a:rPr lang="fr-FR" dirty="0" err="1" smtClean="0"/>
+              <a:t>zanak'i</a:t>
+            </a:r>
+            <a:r>
+              <a:rPr lang="fr-FR" dirty="0" smtClean="0"/>
+              <a:t> </a:t>
+            </a:r>
+            <a:r>
+              <a:rPr lang="fr-FR" dirty="0" err="1" smtClean="0"/>
+              <a:t>Sedeora</a:t>
+            </a:r>
+            <a:r>
+              <a:rPr lang="fr-FR" dirty="0" smtClean="0"/>
+              <a:t>;</a:t>
+            </a:r>
+            <a:endParaRPr dirty="0"/>
           </a:p>
         </p:txBody>
       </p:sp>

</xml_diff>

<commit_message>
feat: current list Boky
</commit_message>
<xml_diff>
--- a/test.pptx
+++ b/test.pptx
@@ -7,6 +7,7 @@
   <p:sldIdLst>
     <p:sldId id="1120" r:id="rId2"/>
     <p:sldId id="1121" r:id="rId3"/>
+    <p:sldId id="1123" r:id="rId4"/>
   </p:sldIdLst>
   <p:sldSz cx="9144000" cy="6858000" type="screen4x3"/>
   <p:notesSz cx="6858000" cy="9144000"/>
@@ -304,7 +305,7 @@
                 <a:tabLst/>
                 <a:defRPr/>
               </a:pPr>
-              <a:t>12/11/2023</a:t>
+              <a:t>18/11/2023</a:t>
             </a:fld>
             <a:endParaRPr kumimoji="0" lang="fr-FR" sz="1200" b="0" i="0" u="none" strike="noStrike" kern="1200" cap="none" spc="0" normalizeH="0" baseline="0" noProof="0">
               <a:ln>
@@ -634,7 +635,7 @@
                 <a:tabLst/>
                 <a:defRPr/>
               </a:pPr>
-              <a:t>12/11/2023</a:t>
+              <a:t>18/11/2023</a:t>
             </a:fld>
             <a:endParaRPr kumimoji="0" lang="fr-FR" sz="1200" b="0" i="0" u="none" strike="noStrike" kern="1200" cap="none" spc="0" normalizeH="0" baseline="0" noProof="0">
               <a:ln>
@@ -974,7 +975,7 @@
                 <a:tabLst/>
                 <a:defRPr/>
               </a:pPr>
-              <a:t>12/11/2023</a:t>
+              <a:t>18/11/2023</a:t>
             </a:fld>
             <a:endParaRPr kumimoji="0" lang="fr-FR" sz="1200" b="0" i="0" u="none" strike="noStrike" kern="1200" cap="none" spc="0" normalizeH="0" baseline="0" noProof="0">
               <a:ln>
@@ -1304,7 +1305,7 @@
                 <a:tabLst/>
                 <a:defRPr/>
               </a:pPr>
-              <a:t>12/11/2023</a:t>
+              <a:t>18/11/2023</a:t>
             </a:fld>
             <a:endParaRPr kumimoji="0" lang="fr-FR" sz="1200" b="0" i="0" u="none" strike="noStrike" kern="1200" cap="none" spc="0" normalizeH="0" baseline="0" noProof="0">
               <a:ln>
@@ -1708,7 +1709,7 @@
                 <a:tabLst/>
                 <a:defRPr/>
               </a:pPr>
-              <a:t>12/11/2023</a:t>
+              <a:t>18/11/2023</a:t>
             </a:fld>
             <a:endParaRPr kumimoji="0" lang="fr-FR" sz="1200" b="0" i="0" u="none" strike="noStrike" kern="1200" cap="none" spc="0" normalizeH="0" baseline="0" noProof="0">
               <a:ln>
@@ -2100,7 +2101,7 @@
                 <a:tabLst/>
                 <a:defRPr/>
               </a:pPr>
-              <a:t>12/11/2023</a:t>
+              <a:t>18/11/2023</a:t>
             </a:fld>
             <a:endParaRPr kumimoji="0" lang="fr-FR" sz="1200" b="0" i="0" u="none" strike="noStrike" kern="1200" cap="none" spc="0" normalizeH="0" baseline="0" noProof="0">
               <a:ln>
@@ -2627,7 +2628,7 @@
                 <a:tabLst/>
                 <a:defRPr/>
               </a:pPr>
-              <a:t>12/11/2023</a:t>
+              <a:t>18/11/2023</a:t>
             </a:fld>
             <a:endParaRPr kumimoji="0" lang="fr-FR" sz="1200" b="0" i="0" u="none" strike="noStrike" kern="1200" cap="none" spc="0" normalizeH="0" baseline="0" noProof="0">
               <a:ln>
@@ -2905,7 +2906,7 @@
                 <a:tabLst/>
                 <a:defRPr/>
               </a:pPr>
-              <a:t>12/11/2023</a:t>
+              <a:t>18/11/2023</a:t>
             </a:fld>
             <a:endParaRPr kumimoji="0" lang="fr-FR" sz="1200" b="0" i="0" u="none" strike="noStrike" kern="1200" cap="none" spc="0" normalizeH="0" baseline="0" noProof="0">
               <a:ln>
@@ -3160,7 +3161,7 @@
                 <a:tabLst/>
                 <a:defRPr/>
               </a:pPr>
-              <a:t>12/11/2023</a:t>
+              <a:t>18/11/2023</a:t>
             </a:fld>
             <a:endParaRPr kumimoji="0" lang="fr-FR" sz="1200" b="0" i="0" u="none" strike="noStrike" kern="1200" cap="none" spc="0" normalizeH="0" baseline="0" noProof="0">
               <a:ln>
@@ -3597,7 +3598,7 @@
                 <a:tabLst/>
                 <a:defRPr/>
               </a:pPr>
-              <a:t>12/11/2023</a:t>
+              <a:t>18/11/2023</a:t>
             </a:fld>
             <a:endParaRPr kumimoji="0" lang="fr-FR" sz="1200" b="0" i="0" u="none" strike="noStrike" kern="1200" cap="none" spc="0" normalizeH="0" baseline="0" noProof="0">
               <a:ln>
@@ -4014,7 +4015,7 @@
                 <a:tabLst/>
                 <a:defRPr/>
               </a:pPr>
-              <a:t>12/11/2023</a:t>
+              <a:t>18/11/2023</a:t>
             </a:fld>
             <a:endParaRPr kumimoji="0" lang="fr-FR" sz="1200" b="0" i="0" u="none" strike="noStrike" kern="1200" cap="none" spc="0" normalizeH="0" baseline="0" noProof="0">
               <a:ln>
@@ -4397,7 +4398,7 @@
                 <a:tabLst/>
                 <a:defRPr/>
               </a:pPr>
-              <a:t>12/11/2023</a:t>
+              <a:t>18/11/2023</a:t>
             </a:fld>
             <a:endParaRPr kumimoji="0" lang="fr-FR" sz="1200" b="0" i="0" u="none" strike="noStrike" kern="1200" cap="none" spc="0" normalizeH="0" baseline="0" noProof="0">
               <a:ln>
@@ -4962,7 +4963,7 @@
             </a:pPr>
             <a:r>
               <a:rPr dirty="0" err="1"/>
-              <a:t>Nomery</a:t>
+              <a:t>Salamo</a:t>
             </a:r>
             <a:r>
               <a:rPr dirty="0"/>
@@ -4980,7 +4981,7 @@
             </a:pPr>
             <a:r>
               <a:rPr dirty="0"/>
-              <a:t>1 : 5</a:t>
+              <a:t>3 : 4 - 5</a:t>
             </a:r>
           </a:p>
         </p:txBody>
@@ -5042,11 +5043,11 @@
             </a:pPr>
             <a:r>
               <a:rPr dirty="0"/>
-              <a:t>5 </a:t>
+              <a:t>4 </a:t>
             </a:r>
             <a:r>
               <a:rPr dirty="0" err="1"/>
-              <a:t>Ary</a:t>
+              <a:t>Amin'ny</a:t>
             </a:r>
             <a:r>
               <a:rPr dirty="0"/>
@@ -5054,7 +5055,7 @@
             </a:r>
             <a:r>
               <a:rPr dirty="0" err="1"/>
-              <a:t>izao</a:t>
+              <a:t>feoko</a:t>
             </a:r>
             <a:r>
               <a:rPr dirty="0"/>
@@ -5062,7 +5063,7 @@
             </a:r>
             <a:r>
               <a:rPr dirty="0" err="1"/>
-              <a:t>anaran'ireo</a:t>
+              <a:t>iantsoako</a:t>
             </a:r>
             <a:r>
               <a:rPr dirty="0"/>
@@ -5070,15 +5071,129 @@
             </a:r>
             <a:r>
               <a:rPr dirty="0" err="1"/>
-              <a:t>lehilahy</a:t>
+              <a:t>an'i</a:t>
             </a:r>
             <a:r>
               <a:rPr dirty="0"/>
-              <a:t> ho </a:t>
+              <a:t> Jehovah</a:t>
+            </a:r>
+            <a:r>
+              <a:rPr dirty="0" smtClean="0"/>
+              <a:t>,</a:t>
+            </a:r>
+            <a:r>
+              <a:rPr lang="en-US" dirty="0" smtClean="0"/>
+              <a:t> </a:t>
+            </a:r>
+            <a:r>
+              <a:rPr lang="en-US" dirty="0" err="1" smtClean="0"/>
+              <a:t>ary</a:t>
+            </a:r>
+            <a:r>
+              <a:rPr lang="en-US" dirty="0" smtClean="0"/>
+              <a:t> any an-</a:t>
+            </a:r>
+            <a:r>
+              <a:rPr lang="en-US" dirty="0" err="1" smtClean="0"/>
+              <a:t>tendrombohiny</a:t>
+            </a:r>
+            <a:r>
+              <a:rPr lang="en-US" dirty="0" smtClean="0"/>
+              <a:t> </a:t>
+            </a:r>
+            <a:r>
+              <a:rPr lang="en-US" dirty="0" err="1" smtClean="0"/>
+              <a:t>masina</a:t>
+            </a:r>
+            <a:r>
+              <a:rPr lang="en-US" dirty="0" smtClean="0"/>
+              <a:t> no </a:t>
+            </a:r>
+            <a:r>
+              <a:rPr lang="en-US" dirty="0" err="1" smtClean="0"/>
+              <a:t>mamaly</a:t>
+            </a:r>
+            <a:r>
+              <a:rPr lang="en-US" dirty="0" smtClean="0"/>
+              <a:t> </a:t>
+            </a:r>
+            <a:r>
+              <a:rPr lang="en-US" dirty="0" err="1" smtClean="0"/>
+              <a:t>ahy</a:t>
+            </a:r>
+            <a:r>
+              <a:rPr lang="en-US" dirty="0" smtClean="0"/>
+              <a:t> </a:t>
+            </a:r>
+            <a:r>
+              <a:rPr lang="en-US" dirty="0" err="1" smtClean="0"/>
+              <a:t>Izy</a:t>
+            </a:r>
+            <a:r>
+              <a:rPr lang="en-US" dirty="0" smtClean="0"/>
+              <a:t>.</a:t>
+            </a:r>
+            <a:endParaRPr dirty="0"/>
+          </a:p>
+        </p:txBody>
+      </p:sp>
+    </p:spTree>
+  </p:cSld>
+  <p:clrMapOvr>
+    <a:masterClrMapping/>
+  </p:clrMapOvr>
+</p:sld>
+</file>
+
+<file path=ppt/slides/slide3.xml><?xml version="1.0" encoding="utf-8"?>
+<p:sld xmlns:a="http://schemas.openxmlformats.org/drawingml/2006/main" xmlns:r="http://schemas.openxmlformats.org/officeDocument/2006/relationships" xmlns:p="http://schemas.openxmlformats.org/presentationml/2006/main">
+  <p:cSld>
+    <p:spTree>
+      <p:nvGrpSpPr>
+        <p:cNvPr id="1" name=""/>
+        <p:cNvGrpSpPr/>
+        <p:nvPr/>
+      </p:nvGrpSpPr>
+      <p:grpSpPr>
+        <a:xfrm>
+          <a:off x="0" y="0"/>
+          <a:ext cx="0" cy="0"/>
+          <a:chOff x="0" y="0"/>
+          <a:chExt cx="0" cy="0"/>
+        </a:xfrm>
+      </p:grpSpPr>
+      <p:sp>
+        <p:nvSpPr>
+          <p:cNvPr id="2" name="Title 1"/>
+          <p:cNvSpPr>
+            <a:spLocks noGrp="1"/>
+          </p:cNvSpPr>
+          <p:nvPr>
+            <p:ph type="title"/>
+          </p:nvPr>
+        </p:nvSpPr>
+        <p:spPr>
+          <a:xfrm>
+            <a:off x="0" y="0"/>
+            <a:ext cx="9144000" cy="6858000"/>
+          </a:xfrm>
+        </p:spPr>
+        <p:txBody>
+          <a:bodyPr/>
+          <a:lstStyle/>
+          <a:p>
+            <a:pPr algn="ctr">
+              <a:defRPr sz="8000">
+                <a:latin typeface="Helvetica Inserat LT Std"/>
+              </a:defRPr>
+            </a:pPr>
+            <a:r>
+              <a:rPr dirty="0"/>
+              <a:t>5 </a:t>
             </a:r>
             <a:r>
               <a:rPr dirty="0" err="1"/>
-              <a:t>namanareo</a:t>
+              <a:t>Izaho</a:t>
             </a:r>
             <a:r>
               <a:rPr dirty="0"/>
@@ -5086,15 +5201,7 @@
             </a:r>
             <a:r>
               <a:rPr dirty="0" err="1"/>
-              <a:t>ireo</a:t>
-            </a:r>
-            <a:r>
-              <a:rPr dirty="0"/>
-              <a:t>: </a:t>
-            </a:r>
-            <a:r>
-              <a:rPr dirty="0" err="1"/>
-              <a:t>Ny</a:t>
+              <a:t>nandry</a:t>
             </a:r>
             <a:r>
               <a:rPr dirty="0"/>
@@ -5102,7 +5209,7 @@
             </a:r>
             <a:r>
               <a:rPr dirty="0" err="1"/>
-              <a:t>avy</a:t>
+              <a:t>ka</a:t>
             </a:r>
             <a:r>
               <a:rPr dirty="0"/>
@@ -5110,7 +5217,15 @@
             </a:r>
             <a:r>
               <a:rPr dirty="0" err="1"/>
-              <a:t>amin'i</a:t>
+              <a:t>natory</a:t>
+            </a:r>
+            <a:r>
+              <a:rPr dirty="0"/>
+              <a:t>; </a:t>
+            </a:r>
+            <a:r>
+              <a:rPr dirty="0" err="1"/>
+              <a:t>nifoha</a:t>
             </a:r>
             <a:r>
               <a:rPr dirty="0"/>
@@ -5118,7 +5233,23 @@
             </a:r>
             <a:r>
               <a:rPr dirty="0" err="1"/>
-              <a:t>Robena</a:t>
+              <a:t>aho</a:t>
+            </a:r>
+            <a:r>
+              <a:rPr dirty="0"/>
+              <a:t>, </a:t>
+            </a:r>
+            <a:r>
+              <a:rPr dirty="0" err="1"/>
+              <a:t>satria</a:t>
+            </a:r>
+            <a:r>
+              <a:rPr dirty="0"/>
+              <a:t> Jehovah no </a:t>
+            </a:r>
+            <a:r>
+              <a:rPr dirty="0" err="1"/>
+              <a:t>manohana</a:t>
             </a:r>
             <a:r>
               <a:rPr dirty="0"/>
@@ -5126,41 +5257,12 @@
             </a:r>
             <a:r>
               <a:rPr dirty="0" err="1"/>
-              <a:t>dia</a:t>
+              <a:t>ahy</a:t>
             </a:r>
             <a:r>
               <a:rPr dirty="0"/>
-              <a:t> </a:t>
-            </a:r>
-            <a:r>
-              <a:rPr dirty="0" err="1"/>
-              <a:t>Elizora</a:t>
-            </a:r>
-            <a:r>
-              <a:rPr dirty="0" smtClean="0"/>
-              <a:t>,</a:t>
-            </a:r>
-            <a:r>
-              <a:rPr lang="fr-FR" dirty="0" smtClean="0"/>
-              <a:t> </a:t>
-            </a:r>
-            <a:r>
-              <a:rPr lang="fr-FR" dirty="0" err="1" smtClean="0"/>
-              <a:t>zanak'i</a:t>
-            </a:r>
-            <a:r>
-              <a:rPr lang="fr-FR" dirty="0" smtClean="0"/>
-              <a:t> </a:t>
-            </a:r>
-            <a:r>
-              <a:rPr lang="fr-FR" dirty="0" err="1" smtClean="0"/>
-              <a:t>Sedeora</a:t>
-            </a:r>
-            <a:r>
-              <a:rPr lang="fr-FR" dirty="0" smtClean="0"/>
-              <a:t>;</a:t>
-            </a:r>
-            <a:endParaRPr dirty="0"/>
+              <a:t>.</a:t>
+            </a:r>
           </a:p>
         </p:txBody>
       </p:sp>

</xml_diff>

<commit_message>
deploy: resolve .env et exe
</commit_message>
<xml_diff>
--- a/test.pptx
+++ b/test.pptx
@@ -7,6 +7,7 @@
   <p:sldIdLst>
     <p:sldId id="1120" r:id="rId2"/>
     <p:sldId id="1121" r:id="rId3"/>
+    <p:sldId id="1125" r:id="rId4"/>
   </p:sldIdLst>
   <p:sldSz cx="9144000" cy="6858000" type="screen4x3"/>
   <p:notesSz cx="6858000" cy="9144000"/>
@@ -304,7 +305,7 @@
                 <a:tabLst/>
                 <a:defRPr/>
               </a:pPr>
-              <a:t>19/11/2023</a:t>
+              <a:t>25/11/2023</a:t>
             </a:fld>
             <a:endParaRPr kumimoji="0" lang="fr-FR" sz="1200" b="0" i="0" u="none" strike="noStrike" kern="1200" cap="none" spc="0" normalizeH="0" baseline="0" noProof="0">
               <a:ln>
@@ -634,7 +635,7 @@
                 <a:tabLst/>
                 <a:defRPr/>
               </a:pPr>
-              <a:t>19/11/2023</a:t>
+              <a:t>25/11/2023</a:t>
             </a:fld>
             <a:endParaRPr kumimoji="0" lang="fr-FR" sz="1200" b="0" i="0" u="none" strike="noStrike" kern="1200" cap="none" spc="0" normalizeH="0" baseline="0" noProof="0">
               <a:ln>
@@ -974,7 +975,7 @@
                 <a:tabLst/>
                 <a:defRPr/>
               </a:pPr>
-              <a:t>19/11/2023</a:t>
+              <a:t>25/11/2023</a:t>
             </a:fld>
             <a:endParaRPr kumimoji="0" lang="fr-FR" sz="1200" b="0" i="0" u="none" strike="noStrike" kern="1200" cap="none" spc="0" normalizeH="0" baseline="0" noProof="0">
               <a:ln>
@@ -1304,7 +1305,7 @@
                 <a:tabLst/>
                 <a:defRPr/>
               </a:pPr>
-              <a:t>19/11/2023</a:t>
+              <a:t>25/11/2023</a:t>
             </a:fld>
             <a:endParaRPr kumimoji="0" lang="fr-FR" sz="1200" b="0" i="0" u="none" strike="noStrike" kern="1200" cap="none" spc="0" normalizeH="0" baseline="0" noProof="0">
               <a:ln>
@@ -1708,7 +1709,7 @@
                 <a:tabLst/>
                 <a:defRPr/>
               </a:pPr>
-              <a:t>19/11/2023</a:t>
+              <a:t>25/11/2023</a:t>
             </a:fld>
             <a:endParaRPr kumimoji="0" lang="fr-FR" sz="1200" b="0" i="0" u="none" strike="noStrike" kern="1200" cap="none" spc="0" normalizeH="0" baseline="0" noProof="0">
               <a:ln>
@@ -2100,7 +2101,7 @@
                 <a:tabLst/>
                 <a:defRPr/>
               </a:pPr>
-              <a:t>19/11/2023</a:t>
+              <a:t>25/11/2023</a:t>
             </a:fld>
             <a:endParaRPr kumimoji="0" lang="fr-FR" sz="1200" b="0" i="0" u="none" strike="noStrike" kern="1200" cap="none" spc="0" normalizeH="0" baseline="0" noProof="0">
               <a:ln>
@@ -2627,7 +2628,7 @@
                 <a:tabLst/>
                 <a:defRPr/>
               </a:pPr>
-              <a:t>19/11/2023</a:t>
+              <a:t>25/11/2023</a:t>
             </a:fld>
             <a:endParaRPr kumimoji="0" lang="fr-FR" sz="1200" b="0" i="0" u="none" strike="noStrike" kern="1200" cap="none" spc="0" normalizeH="0" baseline="0" noProof="0">
               <a:ln>
@@ -2905,7 +2906,7 @@
                 <a:tabLst/>
                 <a:defRPr/>
               </a:pPr>
-              <a:t>19/11/2023</a:t>
+              <a:t>25/11/2023</a:t>
             </a:fld>
             <a:endParaRPr kumimoji="0" lang="fr-FR" sz="1200" b="0" i="0" u="none" strike="noStrike" kern="1200" cap="none" spc="0" normalizeH="0" baseline="0" noProof="0">
               <a:ln>
@@ -3160,7 +3161,7 @@
                 <a:tabLst/>
                 <a:defRPr/>
               </a:pPr>
-              <a:t>19/11/2023</a:t>
+              <a:t>25/11/2023</a:t>
             </a:fld>
             <a:endParaRPr kumimoji="0" lang="fr-FR" sz="1200" b="0" i="0" u="none" strike="noStrike" kern="1200" cap="none" spc="0" normalizeH="0" baseline="0" noProof="0">
               <a:ln>
@@ -3597,7 +3598,7 @@
                 <a:tabLst/>
                 <a:defRPr/>
               </a:pPr>
-              <a:t>19/11/2023</a:t>
+              <a:t>25/11/2023</a:t>
             </a:fld>
             <a:endParaRPr kumimoji="0" lang="fr-FR" sz="1200" b="0" i="0" u="none" strike="noStrike" kern="1200" cap="none" spc="0" normalizeH="0" baseline="0" noProof="0">
               <a:ln>
@@ -4014,7 +4015,7 @@
                 <a:tabLst/>
                 <a:defRPr/>
               </a:pPr>
-              <a:t>19/11/2023</a:t>
+              <a:t>25/11/2023</a:t>
             </a:fld>
             <a:endParaRPr kumimoji="0" lang="fr-FR" sz="1200" b="0" i="0" u="none" strike="noStrike" kern="1200" cap="none" spc="0" normalizeH="0" baseline="0" noProof="0">
               <a:ln>
@@ -4397,7 +4398,7 @@
                 <a:tabLst/>
                 <a:defRPr/>
               </a:pPr>
-              <a:t>19/11/2023</a:t>
+              <a:t>25/11/2023</a:t>
             </a:fld>
             <a:endParaRPr kumimoji="0" lang="fr-FR" sz="1200" b="0" i="0" u="none" strike="noStrike" kern="1200" cap="none" spc="0" normalizeH="0" baseline="0" noProof="0">
               <a:ln>
@@ -4962,7 +4963,7 @@
             </a:pPr>
             <a:r>
               <a:rPr dirty="0" err="1"/>
-              <a:t>Ohabolana</a:t>
+              <a:t>Matio</a:t>
             </a:r>
             <a:r>
               <a:rPr dirty="0"/>
@@ -4980,7 +4981,7 @@
             </a:pPr>
             <a:r>
               <a:rPr dirty="0"/>
-              <a:t>4 : 5</a:t>
+              <a:t>10 : 8</a:t>
             </a:r>
           </a:p>
         </p:txBody>
@@ -5042,11 +5043,11 @@
             </a:pPr>
             <a:r>
               <a:rPr dirty="0"/>
-              <a:t>5 </a:t>
+              <a:t>8 </a:t>
             </a:r>
             <a:r>
               <a:rPr dirty="0" err="1"/>
-              <a:t>Mahazoa</a:t>
+              <a:t>Sitrano</a:t>
             </a:r>
             <a:r>
               <a:rPr dirty="0"/>
@@ -5054,7 +5055,15 @@
             </a:r>
             <a:r>
               <a:rPr dirty="0" err="1"/>
-              <a:t>fahendrena</a:t>
+              <a:t>ny</a:t>
+            </a:r>
+            <a:r>
+              <a:rPr dirty="0"/>
+              <a:t> </a:t>
+            </a:r>
+            <a:r>
+              <a:rPr dirty="0" err="1"/>
+              <a:t>marary</a:t>
             </a:r>
             <a:r>
               <a:rPr dirty="0" smtClean="0"/>
@@ -5066,7 +5075,7 @@
             </a:r>
             <a:r>
               <a:rPr lang="fr-FR" dirty="0" err="1" smtClean="0"/>
-              <a:t>mahazoa</a:t>
+              <a:t>atsangano</a:t>
             </a:r>
             <a:r>
               <a:rPr lang="fr-FR" dirty="0" smtClean="0"/>
@@ -5074,15 +5083,7 @@
             </a:r>
             <a:r>
               <a:rPr lang="fr-FR" dirty="0" err="1" smtClean="0"/>
-              <a:t>fahalalana</a:t>
-            </a:r>
-            <a:r>
-              <a:rPr lang="fr-FR" dirty="0" smtClean="0"/>
-              <a:t>; Fa </a:t>
-            </a:r>
-            <a:r>
-              <a:rPr lang="fr-FR" dirty="0" err="1" smtClean="0"/>
-              <a:t>aza</a:t>
+              <a:t>ny</a:t>
             </a:r>
             <a:r>
               <a:rPr lang="fr-FR" dirty="0" smtClean="0"/>
@@ -5090,15 +5091,15 @@
             </a:r>
             <a:r>
               <a:rPr lang="fr-FR" dirty="0" err="1" smtClean="0"/>
-              <a:t>hadinoina</a:t>
+              <a:t>maty</a:t>
             </a:r>
             <a:r>
               <a:rPr lang="fr-FR" dirty="0" smtClean="0"/>
-              <a:t> na </a:t>
+              <a:t>, </a:t>
             </a:r>
             <a:r>
               <a:rPr lang="fr-FR" dirty="0" err="1" smtClean="0"/>
-              <a:t>ihemorana</a:t>
+              <a:t>diovy</a:t>
             </a:r>
             <a:r>
               <a:rPr lang="fr-FR" dirty="0" smtClean="0"/>
@@ -5114,7 +5115,15 @@
             </a:r>
             <a:r>
               <a:rPr lang="fr-FR" dirty="0" err="1" smtClean="0"/>
-              <a:t>teny</a:t>
+              <a:t>boka</a:t>
+            </a:r>
+            <a:r>
+              <a:rPr lang="fr-FR" dirty="0" smtClean="0"/>
+              <a:t>, </a:t>
+            </a:r>
+            <a:r>
+              <a:rPr lang="fr-FR" dirty="0" err="1" smtClean="0"/>
+              <a:t>avoahy</a:t>
             </a:r>
             <a:r>
               <a:rPr lang="fr-FR" dirty="0" smtClean="0"/>
@@ -5122,7 +5131,7 @@
             </a:r>
             <a:r>
               <a:rPr lang="fr-FR" dirty="0" err="1" smtClean="0"/>
-              <a:t>aloaky</a:t>
+              <a:t>ny</a:t>
             </a:r>
             <a:r>
               <a:rPr lang="fr-FR" dirty="0" smtClean="0"/>
@@ -5130,7 +5139,101 @@
             </a:r>
             <a:r>
               <a:rPr lang="fr-FR" dirty="0" err="1" smtClean="0"/>
-              <a:t>ny</a:t>
+              <a:t>demonia</a:t>
+            </a:r>
+            <a:r>
+              <a:rPr lang="fr-FR" dirty="0" smtClean="0"/>
+              <a:t>;</a:t>
+            </a:r>
+            <a:endParaRPr dirty="0"/>
+          </a:p>
+        </p:txBody>
+      </p:sp>
+    </p:spTree>
+  </p:cSld>
+  <p:clrMapOvr>
+    <a:masterClrMapping/>
+  </p:clrMapOvr>
+</p:sld>
+</file>
+
+<file path=ppt/slides/slide3.xml><?xml version="1.0" encoding="utf-8"?>
+<p:sld xmlns:a="http://schemas.openxmlformats.org/drawingml/2006/main" xmlns:r="http://schemas.openxmlformats.org/officeDocument/2006/relationships" xmlns:p="http://schemas.openxmlformats.org/presentationml/2006/main">
+  <p:cSld>
+    <p:spTree>
+      <p:nvGrpSpPr>
+        <p:cNvPr id="1" name=""/>
+        <p:cNvGrpSpPr/>
+        <p:nvPr/>
+      </p:nvGrpSpPr>
+      <p:grpSpPr>
+        <a:xfrm>
+          <a:off x="0" y="0"/>
+          <a:ext cx="0" cy="0"/>
+          <a:chOff x="0" y="0"/>
+          <a:chExt cx="0" cy="0"/>
+        </a:xfrm>
+      </p:grpSpPr>
+      <p:sp>
+        <p:nvSpPr>
+          <p:cNvPr id="2" name="Title 1"/>
+          <p:cNvSpPr>
+            <a:spLocks noGrp="1"/>
+          </p:cNvSpPr>
+          <p:nvPr>
+            <p:ph type="title"/>
+          </p:nvPr>
+        </p:nvSpPr>
+        <p:spPr>
+          <a:xfrm>
+            <a:off x="0" y="0"/>
+            <a:ext cx="9144000" cy="6858000"/>
+          </a:xfrm>
+        </p:spPr>
+        <p:txBody>
+          <a:bodyPr/>
+          <a:lstStyle/>
+          <a:p>
+            <a:pPr algn="ctr">
+              <a:defRPr sz="8000">
+                <a:latin typeface="Helvetica Inserat LT Std"/>
+              </a:defRPr>
+            </a:pPr>
+            <a:r>
+              <a:rPr dirty="0" smtClean="0"/>
+              <a:t> </a:t>
+            </a:r>
+            <a:r>
+              <a:rPr dirty="0" err="1" smtClean="0"/>
+              <a:t>efa</a:t>
+            </a:r>
+            <a:r>
+              <a:rPr dirty="0" smtClean="0"/>
+              <a:t> </a:t>
+            </a:r>
+            <a:r>
+              <a:rPr dirty="0" err="1" smtClean="0"/>
+              <a:t>nahazo</a:t>
+            </a:r>
+            <a:r>
+              <a:rPr dirty="0" smtClean="0"/>
+              <a:t> </a:t>
+            </a:r>
+            <a:r>
+              <a:rPr dirty="0" err="1" smtClean="0"/>
+              <a:t>maimaimpoana</a:t>
+            </a:r>
+            <a:r>
+              <a:rPr dirty="0" smtClean="0"/>
+              <a:t> </a:t>
+            </a:r>
+            <a:r>
+              <a:rPr dirty="0" err="1" smtClean="0"/>
+              <a:t>ianareo</a:t>
+            </a:r>
+            <a:r>
+              <a:rPr dirty="0" smtClean="0"/>
+              <a:t>,</a:t>
             </a:r>
             <a:r>
               <a:rPr lang="fr-FR" dirty="0" smtClean="0"/>
@@ -5138,7 +5241,23 @@
             </a:r>
             <a:r>
               <a:rPr lang="fr-FR" dirty="0" err="1" smtClean="0"/>
-              <a:t>vavako</a:t>
+              <a:t>koa</a:t>
+            </a:r>
+            <a:r>
+              <a:rPr lang="fr-FR" dirty="0" smtClean="0"/>
+              <a:t> </a:t>
+            </a:r>
+            <a:r>
+              <a:rPr lang="fr-FR" dirty="0" err="1" smtClean="0"/>
+              <a:t>manomeza</a:t>
+            </a:r>
+            <a:r>
+              <a:rPr lang="fr-FR" dirty="0" smtClean="0"/>
+              <a:t> </a:t>
+            </a:r>
+            <a:r>
+              <a:rPr lang="fr-FR" dirty="0" err="1" smtClean="0"/>
+              <a:t>maimaimpoana</a:t>
             </a:r>
             <a:r>
               <a:rPr lang="fr-FR" dirty="0" smtClean="0"/>

</xml_diff>

<commit_message>
feat: export and requirements
</commit_message>
<xml_diff>
--- a/test.pptx
+++ b/test.pptx
@@ -7,7 +7,9 @@
   <p:sldIdLst>
     <p:sldId id="1120" r:id="rId2"/>
     <p:sldId id="1121" r:id="rId3"/>
-    <p:sldId id="1125" r:id="rId4"/>
+    <p:sldId id="1123" r:id="rId4"/>
+    <p:sldId id="1125" r:id="rId5"/>
+    <p:sldId id="1128" r:id="rId6"/>
   </p:sldIdLst>
   <p:sldSz cx="9144000" cy="6858000" type="screen4x3"/>
   <p:notesSz cx="6858000" cy="9144000"/>
@@ -4962,8 +4964,12 @@
               </a:defRPr>
             </a:pPr>
             <a:r>
+              <a:rPr dirty="0"/>
+              <a:t>II </a:t>
+            </a:r>
+            <a:r>
               <a:rPr dirty="0" err="1"/>
-              <a:t>Matio</a:t>
+              <a:t>Tantara</a:t>
             </a:r>
             <a:r>
               <a:rPr dirty="0"/>
@@ -4981,7 +4987,7 @@
             </a:pPr>
             <a:r>
               <a:rPr dirty="0"/>
-              <a:t>10 : 8</a:t>
+              <a:t>20 : 20</a:t>
             </a:r>
           </a:p>
         </p:txBody>
@@ -5043,11 +5049,11 @@
             </a:pPr>
             <a:r>
               <a:rPr dirty="0"/>
-              <a:t>8 </a:t>
+              <a:t>20 </a:t>
             </a:r>
             <a:r>
               <a:rPr dirty="0" err="1"/>
-              <a:t>Sitrano</a:t>
+              <a:t>Ary</a:t>
             </a:r>
             <a:r>
               <a:rPr dirty="0"/>
@@ -5055,7 +5061,7 @@
             </a:r>
             <a:r>
               <a:rPr dirty="0" err="1"/>
-              <a:t>ny</a:t>
+              <a:t>nifoha</a:t>
             </a:r>
             <a:r>
               <a:rPr dirty="0"/>
@@ -5063,7 +5069,23 @@
             </a:r>
             <a:r>
               <a:rPr dirty="0" err="1"/>
-              <a:t>marary</a:t>
+              <a:t>maraina</a:t>
+            </a:r>
+            <a:r>
+              <a:rPr dirty="0"/>
+              <a:t> </a:t>
+            </a:r>
+            <a:r>
+              <a:rPr dirty="0" err="1"/>
+              <a:t>koa</a:t>
+            </a:r>
+            <a:r>
+              <a:rPr dirty="0"/>
+              <a:t> </a:t>
+            </a:r>
+            <a:r>
+              <a:rPr dirty="0" err="1"/>
+              <a:t>izy</a:t>
             </a:r>
             <a:r>
               <a:rPr dirty="0" smtClean="0"/>
@@ -5071,11 +5093,11 @@
             </a:r>
             <a:r>
               <a:rPr lang="fr-FR" dirty="0" smtClean="0"/>
-              <a:t> </a:t>
+              <a:t> dia </a:t>
             </a:r>
             <a:r>
               <a:rPr lang="fr-FR" dirty="0" err="1" smtClean="0"/>
-              <a:t>atsangano</a:t>
+              <a:t>niainga</a:t>
             </a:r>
             <a:r>
               <a:rPr lang="fr-FR" dirty="0" smtClean="0"/>
@@ -5083,7 +5105,15 @@
             </a:r>
             <a:r>
               <a:rPr lang="fr-FR" dirty="0" err="1" smtClean="0"/>
-              <a:t>ny</a:t>
+              <a:t>nankany</a:t>
+            </a:r>
+            <a:r>
+              <a:rPr lang="fr-FR" dirty="0" smtClean="0"/>
+              <a:t> an-</a:t>
+            </a:r>
+            <a:r>
+              <a:rPr lang="fr-FR" dirty="0" err="1" smtClean="0"/>
+              <a:t>efitr'i</a:t>
             </a:r>
             <a:r>
               <a:rPr lang="fr-FR" dirty="0" smtClean="0"/>
@@ -5091,55 +5121,7 @@
             </a:r>
             <a:r>
               <a:rPr lang="fr-FR" dirty="0" err="1" smtClean="0"/>
-              <a:t>maty</a:t>
-            </a:r>
-            <a:r>
-              <a:rPr lang="fr-FR" dirty="0" smtClean="0"/>
-              <a:t>, </a:t>
-            </a:r>
-            <a:r>
-              <a:rPr lang="fr-FR" dirty="0" err="1" smtClean="0"/>
-              <a:t>diovy</a:t>
-            </a:r>
-            <a:r>
-              <a:rPr lang="fr-FR" dirty="0" smtClean="0"/>
-              <a:t> </a:t>
-            </a:r>
-            <a:r>
-              <a:rPr lang="fr-FR" dirty="0" err="1" smtClean="0"/>
-              <a:t>ny</a:t>
-            </a:r>
-            <a:r>
-              <a:rPr lang="fr-FR" dirty="0" smtClean="0"/>
-              <a:t> </a:t>
-            </a:r>
-            <a:r>
-              <a:rPr lang="fr-FR" dirty="0" err="1" smtClean="0"/>
-              <a:t>boka</a:t>
-            </a:r>
-            <a:r>
-              <a:rPr lang="fr-FR" dirty="0" smtClean="0"/>
-              <a:t>, </a:t>
-            </a:r>
-            <a:r>
-              <a:rPr lang="fr-FR" dirty="0" err="1" smtClean="0"/>
-              <a:t>avoahy</a:t>
-            </a:r>
-            <a:r>
-              <a:rPr lang="fr-FR" dirty="0" smtClean="0"/>
-              <a:t> </a:t>
-            </a:r>
-            <a:r>
-              <a:rPr lang="fr-FR" dirty="0" err="1" smtClean="0"/>
-              <a:t>ny</a:t>
-            </a:r>
-            <a:r>
-              <a:rPr lang="fr-FR" dirty="0" smtClean="0"/>
-              <a:t> </a:t>
-            </a:r>
-            <a:r>
-              <a:rPr lang="fr-FR" dirty="0" err="1" smtClean="0"/>
-              <a:t>demonia</a:t>
+              <a:t>Tekoa</a:t>
             </a:r>
             <a:r>
               <a:rPr lang="fr-FR" dirty="0" smtClean="0"/>
@@ -5200,48 +5182,118 @@
               </a:defRPr>
             </a:pPr>
             <a:r>
-              <a:rPr dirty="0" smtClean="0"/>
+              <a:rPr dirty="0"/>
               <a:t> </a:t>
             </a:r>
             <a:r>
-              <a:rPr dirty="0" err="1" smtClean="0"/>
-              <a:t>efa</a:t>
-            </a:r>
-            <a:r>
-              <a:rPr dirty="0" smtClean="0"/>
+              <a:rPr dirty="0" err="1"/>
+              <a:t>ary</a:t>
+            </a:r>
+            <a:r>
+              <a:rPr dirty="0"/>
               <a:t> </a:t>
             </a:r>
             <a:r>
-              <a:rPr dirty="0" err="1" smtClean="0"/>
-              <a:t>nahazo</a:t>
-            </a:r>
-            <a:r>
-              <a:rPr dirty="0" smtClean="0"/>
+              <a:rPr dirty="0" err="1"/>
+              <a:t>nony</a:t>
+            </a:r>
+            <a:r>
+              <a:rPr dirty="0"/>
               <a:t> </a:t>
             </a:r>
             <a:r>
-              <a:rPr dirty="0" err="1" smtClean="0"/>
-              <a:t>maimaimpoana</a:t>
-            </a:r>
-            <a:r>
-              <a:rPr dirty="0" smtClean="0"/>
+              <a:rPr dirty="0" err="1"/>
+              <a:t>nivoaka</a:t>
+            </a:r>
+            <a:r>
+              <a:rPr dirty="0"/>
               <a:t> </a:t>
             </a:r>
             <a:r>
-              <a:rPr dirty="0" err="1" smtClean="0"/>
-              <a:t>ianareo</a:t>
+              <a:rPr dirty="0" err="1"/>
+              <a:t>izy</a:t>
             </a:r>
             <a:r>
               <a:rPr dirty="0" smtClean="0"/>
               <a:t>,</a:t>
             </a:r>
             <a:r>
+              <a:rPr lang="fi-FI" dirty="0" smtClean="0"/>
+              <a:t> dia nitsangana teo Josafata ka nanao hoe: Mihainoa ahy, ry Joda</a:t>
+            </a:r>
+            <a:endParaRPr dirty="0"/>
+          </a:p>
+        </p:txBody>
+      </p:sp>
+    </p:spTree>
+  </p:cSld>
+  <p:clrMapOvr>
+    <a:masterClrMapping/>
+  </p:clrMapOvr>
+</p:sld>
+</file>
+
+<file path=ppt/slides/slide4.xml><?xml version="1.0" encoding="utf-8"?>
+<p:sld xmlns:a="http://schemas.openxmlformats.org/drawingml/2006/main" xmlns:r="http://schemas.openxmlformats.org/officeDocument/2006/relationships" xmlns:p="http://schemas.openxmlformats.org/presentationml/2006/main">
+  <p:cSld>
+    <p:spTree>
+      <p:nvGrpSpPr>
+        <p:cNvPr id="1" name=""/>
+        <p:cNvGrpSpPr/>
+        <p:nvPr/>
+      </p:nvGrpSpPr>
+      <p:grpSpPr>
+        <a:xfrm>
+          <a:off x="0" y="0"/>
+          <a:ext cx="0" cy="0"/>
+          <a:chOff x="0" y="0"/>
+          <a:chExt cx="0" cy="0"/>
+        </a:xfrm>
+      </p:grpSpPr>
+      <p:sp>
+        <p:nvSpPr>
+          <p:cNvPr id="2" name="Title 1"/>
+          <p:cNvSpPr>
+            <a:spLocks noGrp="1"/>
+          </p:cNvSpPr>
+          <p:nvPr>
+            <p:ph type="title"/>
+          </p:nvPr>
+        </p:nvSpPr>
+        <p:spPr>
+          <a:xfrm>
+            <a:off x="0" y="0"/>
+            <a:ext cx="9144000" cy="6858000"/>
+          </a:xfrm>
+        </p:spPr>
+        <p:txBody>
+          <a:bodyPr/>
+          <a:lstStyle/>
+          <a:p>
+            <a:pPr algn="ctr">
+              <a:defRPr sz="8000">
+                <a:latin typeface="Helvetica Inserat LT Std"/>
+              </a:defRPr>
+            </a:pPr>
+            <a:r>
+              <a:rPr lang="fr-FR" dirty="0" err="1" smtClean="0"/>
+              <a:t>sy</a:t>
+            </a:r>
+            <a:r>
               <a:rPr lang="fr-FR" dirty="0" smtClean="0"/>
               <a:t> </a:t>
             </a:r>
             <a:r>
               <a:rPr lang="fr-FR" dirty="0" err="1" smtClean="0"/>
-              <a:t>koa</a:t>
+              <a:t>ianareo</a:t>
+            </a:r>
+            <a:r>
+              <a:rPr lang="fr-FR" dirty="0" smtClean="0"/>
+              <a:t>, </a:t>
+            </a:r>
+            <a:r>
+              <a:rPr lang="fr-FR" dirty="0" err="1" smtClean="0"/>
+              <a:t>ry</a:t>
             </a:r>
             <a:r>
               <a:rPr lang="fr-FR" dirty="0" smtClean="0"/>
@@ -5249,7 +5301,7 @@
             </a:r>
             <a:r>
               <a:rPr lang="fr-FR" dirty="0" err="1" smtClean="0"/>
-              <a:t>manomeza</a:t>
+              <a:t>mponina</a:t>
             </a:r>
             <a:r>
               <a:rPr lang="fr-FR" dirty="0" smtClean="0"/>
@@ -5257,7 +5309,173 @@
             </a:r>
             <a:r>
               <a:rPr lang="fr-FR" dirty="0" err="1" smtClean="0"/>
-              <a:t>maimaimpoana</a:t>
+              <a:t>eto</a:t>
+            </a:r>
+            <a:r>
+              <a:rPr lang="fr-FR" dirty="0" smtClean="0"/>
+              <a:t> </a:t>
+            </a:r>
+            <a:r>
+              <a:rPr lang="fr-FR" dirty="0" err="1" smtClean="0"/>
+              <a:t>Jerosalema</a:t>
+            </a:r>
+            <a:r>
+              <a:rPr lang="fr-FR" dirty="0" smtClean="0"/>
+              <a:t>: </a:t>
+            </a:r>
+            <a:r>
+              <a:rPr lang="fr-FR" dirty="0" err="1" smtClean="0"/>
+              <a:t>Minoa</a:t>
+            </a:r>
+            <a:r>
+              <a:rPr lang="fr-FR" dirty="0" smtClean="0"/>
+              <a:t> </a:t>
+            </a:r>
+            <a:r>
+              <a:rPr lang="fr-FR" dirty="0" err="1" smtClean="0"/>
+              <a:t>an'i</a:t>
+            </a:r>
+            <a:r>
+              <a:rPr lang="fr-FR" dirty="0" smtClean="0"/>
+              <a:t> </a:t>
+            </a:r>
+            <a:r>
+              <a:rPr lang="fr-FR" dirty="0" err="1" smtClean="0"/>
+              <a:t>Jehovah</a:t>
+            </a:r>
+            <a:r>
+              <a:rPr lang="fr-FR" dirty="0" smtClean="0"/>
+              <a:t> </a:t>
+            </a:r>
+            <a:r>
+              <a:rPr lang="fr-FR" dirty="0" err="1" smtClean="0"/>
+              <a:t>Andriamanitrareo</a:t>
+            </a:r>
+            <a:r>
+              <a:rPr lang="fr-FR" dirty="0" smtClean="0"/>
+              <a:t>,</a:t>
+            </a:r>
+            <a:endParaRPr dirty="0"/>
+          </a:p>
+        </p:txBody>
+      </p:sp>
+    </p:spTree>
+  </p:cSld>
+  <p:clrMapOvr>
+    <a:masterClrMapping/>
+  </p:clrMapOvr>
+</p:sld>
+</file>
+
+<file path=ppt/slides/slide5.xml><?xml version="1.0" encoding="utf-8"?>
+<p:sld xmlns:a="http://schemas.openxmlformats.org/drawingml/2006/main" xmlns:r="http://schemas.openxmlformats.org/officeDocument/2006/relationships" xmlns:p="http://schemas.openxmlformats.org/presentationml/2006/main">
+  <p:cSld>
+    <p:spTree>
+      <p:nvGrpSpPr>
+        <p:cNvPr id="1" name=""/>
+        <p:cNvGrpSpPr/>
+        <p:nvPr/>
+      </p:nvGrpSpPr>
+      <p:grpSpPr>
+        <a:xfrm>
+          <a:off x="0" y="0"/>
+          <a:ext cx="0" cy="0"/>
+          <a:chOff x="0" y="0"/>
+          <a:chExt cx="0" cy="0"/>
+        </a:xfrm>
+      </p:grpSpPr>
+      <p:sp>
+        <p:nvSpPr>
+          <p:cNvPr id="2" name="Title 1"/>
+          <p:cNvSpPr>
+            <a:spLocks noGrp="1"/>
+          </p:cNvSpPr>
+          <p:nvPr>
+            <p:ph type="title"/>
+          </p:nvPr>
+        </p:nvSpPr>
+        <p:spPr>
+          <a:xfrm>
+            <a:off x="0" y="0"/>
+            <a:ext cx="9144000" cy="6858000"/>
+          </a:xfrm>
+        </p:spPr>
+        <p:txBody>
+          <a:bodyPr/>
+          <a:lstStyle/>
+          <a:p>
+            <a:pPr algn="ctr">
+              <a:defRPr sz="8000">
+                <a:latin typeface="Helvetica Inserat LT Std"/>
+              </a:defRPr>
+            </a:pPr>
+            <a:r>
+              <a:rPr dirty="0"/>
+              <a:t> </a:t>
+            </a:r>
+            <a:r>
+              <a:rPr dirty="0" err="1"/>
+              <a:t>dia</a:t>
+            </a:r>
+            <a:r>
+              <a:rPr dirty="0"/>
+              <a:t> ho </a:t>
+            </a:r>
+            <a:r>
+              <a:rPr dirty="0" err="1"/>
+              <a:t>tafatoetra</a:t>
+            </a:r>
+            <a:r>
+              <a:rPr dirty="0"/>
+              <a:t> </a:t>
+            </a:r>
+            <a:r>
+              <a:rPr dirty="0" err="1"/>
+              <a:t>ianareo</a:t>
+            </a:r>
+            <a:r>
+              <a:rPr dirty="0" smtClean="0"/>
+              <a:t>;</a:t>
+            </a:r>
+            <a:r>
+              <a:rPr lang="fr-FR" dirty="0" smtClean="0"/>
+              <a:t> </a:t>
+            </a:r>
+            <a:r>
+              <a:rPr lang="fr-FR" dirty="0" err="1" smtClean="0"/>
+              <a:t>minoa</a:t>
+            </a:r>
+            <a:r>
+              <a:rPr lang="fr-FR" dirty="0" smtClean="0"/>
+              <a:t> </a:t>
+            </a:r>
+            <a:r>
+              <a:rPr lang="fr-FR" dirty="0" err="1" smtClean="0"/>
+              <a:t>ny</a:t>
+            </a:r>
+            <a:r>
+              <a:rPr lang="fr-FR" dirty="0" smtClean="0"/>
+              <a:t> </a:t>
+            </a:r>
+            <a:r>
+              <a:rPr lang="fr-FR" dirty="0" err="1" smtClean="0"/>
+              <a:t>mpaminaniny</a:t>
+            </a:r>
+            <a:r>
+              <a:rPr lang="fr-FR" dirty="0" smtClean="0"/>
+              <a:t>, dia </a:t>
+            </a:r>
+            <a:r>
+              <a:rPr lang="fr-FR" dirty="0" err="1" smtClean="0"/>
+              <a:t>hambinina</a:t>
+            </a:r>
+            <a:r>
+              <a:rPr lang="fr-FR" dirty="0" smtClean="0"/>
+              <a:t> </a:t>
+            </a:r>
+            <a:r>
+              <a:rPr lang="fr-FR" dirty="0" err="1" smtClean="0"/>
+              <a:t>ianareo</a:t>
             </a:r>
             <a:r>
               <a:rPr lang="fr-FR" dirty="0" smtClean="0"/>

</xml_diff>